<commit_message>
task(3): updated presentation (#13)
</commit_message>
<xml_diff>
--- a/tasks/task3/task3_presentation.pptx
+++ b/tasks/task3/task3_presentation.pptx
@@ -2585,7 +2585,7 @@
                 </a:solidFill>
                 <a:latin typeface="+mj-lt"/>
               </a:rPr>
-              <a:t>&lt;Task 3&gt;</a:t>
+              <a:t>Task 3</a:t>
             </a:r>
           </a:p>
         </p:txBody>
@@ -2680,7 +2680,7 @@
         </p:nvSpPr>
         <p:spPr>
           <a:xfrm>
-            <a:off x="850665" y="692696"/>
+            <a:off x="850665" y="671518"/>
             <a:ext cx="10515600" cy="471587"/>
           </a:xfrm>
         </p:spPr>
@@ -2779,8 +2779,8 @@
         </p:nvSpPr>
         <p:spPr>
           <a:xfrm>
-            <a:off x="850665" y="1772816"/>
-            <a:ext cx="5185776" cy="3970318"/>
+            <a:off x="850665" y="1460599"/>
+            <a:ext cx="5185776" cy="5078313"/>
           </a:xfrm>
           <a:prstGeom prst="rect">
             <a:avLst/>
@@ -2802,7 +2802,7 @@
             </a:pPr>
             <a:r>
               <a:rPr lang="en-US" dirty="0"/>
-              <a:t>Page size is 8kb</a:t>
+              <a:t>Page size: 8kb</a:t>
             </a:r>
           </a:p>
           <a:p>
@@ -2821,14 +2821,53 @@
           <a:p>
             <a:pPr marL="742950" lvl="1" indent="-285750">
               <a:lnSpc>
-                <a:spcPct val="200000"/>
+                <a:spcPct val="150000"/>
               </a:lnSpc>
               <a:buFont typeface="Arial" panose="020B0604020202020204" pitchFamily="34" charset="0"/>
               <a:buChar char="•"/>
             </a:pPr>
             <a:r>
               <a:rPr lang="en-US" dirty="0"/>
-              <a:t>Number of rows, page type, free space, …</a:t>
+              <a:t>Number of rows</a:t>
+            </a:r>
+          </a:p>
+          <a:p>
+            <a:pPr marL="742950" lvl="1" indent="-285750">
+              <a:lnSpc>
+                <a:spcPct val="150000"/>
+              </a:lnSpc>
+              <a:buFont typeface="Arial" panose="020B0604020202020204" pitchFamily="34" charset="0"/>
+              <a:buChar char="•"/>
+            </a:pPr>
+            <a:r>
+              <a:rPr lang="en-US" dirty="0"/>
+              <a:t>page type</a:t>
+            </a:r>
+          </a:p>
+          <a:p>
+            <a:pPr marL="742950" lvl="1" indent="-285750">
+              <a:lnSpc>
+                <a:spcPct val="150000"/>
+              </a:lnSpc>
+              <a:buFont typeface="Arial" panose="020B0604020202020204" pitchFamily="34" charset="0"/>
+              <a:buChar char="•"/>
+            </a:pPr>
+            <a:r>
+              <a:rPr lang="en-US" dirty="0"/>
+              <a:t>free space</a:t>
+            </a:r>
+          </a:p>
+          <a:p>
+            <a:pPr marL="742950" lvl="1" indent="-285750">
+              <a:lnSpc>
+                <a:spcPct val="150000"/>
+              </a:lnSpc>
+              <a:buFont typeface="Arial" panose="020B0604020202020204" pitchFamily="34" charset="0"/>
+              <a:buChar char="•"/>
+            </a:pPr>
+            <a:r>
+              <a:rPr lang="en-US" dirty="0"/>
+              <a:t>…</a:t>
             </a:r>
           </a:p>
           <a:p>
@@ -2854,7 +2893,7 @@
             </a:pPr>
             <a:r>
               <a:rPr lang="en-US" dirty="0"/>
-              <a:t>Row offset at end in reverse sequence from rows</a:t>
+              <a:t>Row offset at end, reverse from rows</a:t>
             </a:r>
           </a:p>
           <a:p>
@@ -2916,8 +2955,8 @@
         </p:blipFill>
         <p:spPr bwMode="auto">
           <a:xfrm>
-            <a:off x="7098432" y="2060848"/>
-            <a:ext cx="3024336" cy="2468846"/>
+            <a:off x="6816080" y="2060848"/>
+            <a:ext cx="3906434" cy="3188926"/>
           </a:xfrm>
           <a:prstGeom prst="rect">
             <a:avLst/>
@@ -2964,39 +3003,6 @@
           <a:chExt cx="0" cy="0"/>
         </a:xfrm>
       </p:grpSpPr>
-      <p:sp>
-        <p:nvSpPr>
-          <p:cNvPr id="2" name="Titel 1">
-            <a:extLst>
-              <a:ext uri="{FF2B5EF4-FFF2-40B4-BE49-F238E27FC236}">
-                <a16:creationId xmlns:a16="http://schemas.microsoft.com/office/drawing/2014/main" id="{42BBACBA-6004-425D-8015-080FBD3D584A}"/>
-              </a:ext>
-            </a:extLst>
-          </p:cNvPr>
-          <p:cNvSpPr>
-            <a:spLocks noGrp="1"/>
-          </p:cNvSpPr>
-          <p:nvPr>
-            <p:ph type="title"/>
-          </p:nvPr>
-        </p:nvSpPr>
-        <p:spPr>
-          <a:xfrm>
-            <a:off x="623392" y="767356"/>
-            <a:ext cx="10515600" cy="471587"/>
-          </a:xfrm>
-        </p:spPr>
-        <p:txBody>
-          <a:bodyPr/>
-          <a:lstStyle/>
-          <a:p>
-            <a:r>
-              <a:rPr lang="en-US" dirty="0"/>
-              <a:t>Comparison with block from lecture</a:t>
-            </a:r>
-          </a:p>
-        </p:txBody>
-      </p:sp>
       <p:pic>
         <p:nvPicPr>
           <p:cNvPr id="7" name="Inhaltsplatzhalter 6">
@@ -3021,7 +3027,7 @@
         </p:blipFill>
         <p:spPr>
           <a:xfrm>
-            <a:off x="860293" y="1628800"/>
+            <a:off x="840993" y="1628800"/>
             <a:ext cx="6739385" cy="2266640"/>
           </a:xfrm>
         </p:spPr>
@@ -3189,7 +3195,7 @@
             </a:pPr>
             <a:r>
               <a:rPr lang="en-US" dirty="0"/>
-              <a:t>Size is 4kb</a:t>
+              <a:t>Size: 4kb</a:t>
             </a:r>
           </a:p>
           <a:p>
@@ -3198,6 +3204,59 @@
               <a:buChar char="•"/>
             </a:pPr>
             <a:endParaRPr lang="en-US" dirty="0"/>
+          </a:p>
+        </p:txBody>
+      </p:sp>
+      <p:sp>
+        <p:nvSpPr>
+          <p:cNvPr id="10" name="Titel 1">
+            <a:extLst>
+              <a:ext uri="{FF2B5EF4-FFF2-40B4-BE49-F238E27FC236}">
+                <a16:creationId xmlns:a16="http://schemas.microsoft.com/office/drawing/2014/main" id="{56524952-553C-47D1-961F-F3287D4F7EB7}"/>
+              </a:ext>
+            </a:extLst>
+          </p:cNvPr>
+          <p:cNvSpPr txBox="1">
+            <a:spLocks/>
+          </p:cNvSpPr>
+          <p:nvPr/>
+        </p:nvSpPr>
+        <p:spPr>
+          <a:xfrm>
+            <a:off x="850665" y="671518"/>
+            <a:ext cx="10515600" cy="471587"/>
+          </a:xfrm>
+          <a:prstGeom prst="rect">
+            <a:avLst/>
+          </a:prstGeom>
+        </p:spPr>
+        <p:txBody>
+          <a:bodyPr/>
+          <a:lstStyle>
+            <a:lvl1pPr algn="l" defTabSz="914400" rtl="0" eaLnBrk="1" latinLnBrk="0" hangingPunct="1">
+              <a:lnSpc>
+                <a:spcPct val="90000"/>
+              </a:lnSpc>
+              <a:spcBef>
+                <a:spcPct val="0"/>
+              </a:spcBef>
+              <a:buNone/>
+              <a:defRPr sz="3000" kern="1200">
+                <a:solidFill>
+                  <a:schemeClr val="tx1"/>
+                </a:solidFill>
+                <a:latin typeface="+mj-lt"/>
+                <a:ea typeface="+mj-ea"/>
+                <a:cs typeface="+mj-cs"/>
+              </a:defRPr>
+            </a:lvl1pPr>
+          </a:lstStyle>
+          <a:p>
+            <a:r>
+              <a:rPr lang="en-US" dirty="0"/>
+              <a:t>Comparison with block from lecture</a:t>
+            </a:r>
+            <a:endParaRPr lang="de-DE" dirty="0"/>
           </a:p>
         </p:txBody>
       </p:sp>
@@ -3231,39 +3290,6 @@
           <a:chExt cx="0" cy="0"/>
         </a:xfrm>
       </p:grpSpPr>
-      <p:sp>
-        <p:nvSpPr>
-          <p:cNvPr id="2" name="Titel 1">
-            <a:extLst>
-              <a:ext uri="{FF2B5EF4-FFF2-40B4-BE49-F238E27FC236}">
-                <a16:creationId xmlns:a16="http://schemas.microsoft.com/office/drawing/2014/main" id="{49D79859-FB2B-44CE-88CD-2EDC9BFF3CDA}"/>
-              </a:ext>
-            </a:extLst>
-          </p:cNvPr>
-          <p:cNvSpPr>
-            <a:spLocks noGrp="1"/>
-          </p:cNvSpPr>
-          <p:nvPr>
-            <p:ph type="title"/>
-          </p:nvPr>
-        </p:nvSpPr>
-        <p:spPr>
-          <a:xfrm>
-            <a:off x="816317" y="620688"/>
-            <a:ext cx="10515600" cy="471587"/>
-          </a:xfrm>
-        </p:spPr>
-        <p:txBody>
-          <a:bodyPr/>
-          <a:lstStyle/>
-          <a:p>
-            <a:r>
-              <a:rPr lang="en-GB" dirty="0"/>
-              <a:t>Record Format SQL Server</a:t>
-            </a:r>
-          </a:p>
-        </p:txBody>
-      </p:sp>
       <p:pic>
         <p:nvPicPr>
           <p:cNvPr id="7" name="Inhaltsplatzhalter 6">
@@ -3287,7 +3313,7 @@
         </p:blipFill>
         <p:spPr>
           <a:xfrm>
-            <a:off x="5669293" y="1775981"/>
+            <a:off x="6066373" y="2068146"/>
             <a:ext cx="5662624" cy="3355975"/>
           </a:xfrm>
         </p:spPr>
@@ -3376,8 +3402,8 @@
         </p:nvSpPr>
         <p:spPr>
           <a:xfrm>
-            <a:off x="623392" y="1628800"/>
-            <a:ext cx="4896544" cy="3839513"/>
+            <a:off x="816317" y="1196752"/>
+            <a:ext cx="4968552" cy="4096634"/>
           </a:xfrm>
           <a:prstGeom prst="rect">
             <a:avLst/>
@@ -3391,6 +3417,9 @@
           <a:lstStyle/>
           <a:p>
             <a:pPr marL="285750" indent="-285750">
+              <a:lnSpc>
+                <a:spcPct val="150000"/>
+              </a:lnSpc>
               <a:spcAft>
                 <a:spcPts val="300"/>
               </a:spcAft>
@@ -3412,6 +3441,9 @@
           </a:p>
           <a:p>
             <a:pPr marL="285750" indent="-285750">
+              <a:lnSpc>
+                <a:spcPct val="150000"/>
+              </a:lnSpc>
               <a:spcAft>
                 <a:spcPts val="300"/>
               </a:spcAft>
@@ -3425,6 +3457,9 @@
           </a:p>
           <a:p>
             <a:pPr marL="742950" lvl="1" indent="-285750">
+              <a:lnSpc>
+                <a:spcPct val="150000"/>
+              </a:lnSpc>
               <a:spcAft>
                 <a:spcPts val="300"/>
               </a:spcAft>
@@ -3432,12 +3467,19 @@
               <a:buChar char="•"/>
             </a:pPr>
             <a:r>
+              <a:rPr lang="en-US" b="1" dirty="0"/>
+              <a:t>Tag A, Tag B: </a:t>
+            </a:r>
+            <a:r>
               <a:rPr lang="en-US" dirty="0"/>
-              <a:t>Status bits (bitmap) for row data</a:t>
+              <a:t>Status bits for row data</a:t>
             </a:r>
           </a:p>
           <a:p>
             <a:pPr marL="742950" lvl="1" indent="-285750">
+              <a:lnSpc>
+                <a:spcPct val="150000"/>
+              </a:lnSpc>
               <a:spcAft>
                 <a:spcPts val="300"/>
               </a:spcAft>
@@ -3445,6 +3487,14 @@
               <a:buChar char="•"/>
             </a:pPr>
             <a:r>
+              <a:rPr lang="en-US" b="1" dirty="0" err="1"/>
+              <a:t>Fsize</a:t>
+            </a:r>
+            <a:r>
+              <a:rPr lang="en-US" b="1" dirty="0"/>
+              <a:t>: </a:t>
+            </a:r>
+            <a:r>
               <a:rPr lang="en-US" dirty="0"/>
               <a:t>Pointer to end of fixed data (</a:t>
             </a:r>
@@ -3459,6 +3509,9 @@
           </a:p>
           <a:p>
             <a:pPr marL="742950" lvl="1" indent="-285750">
+              <a:lnSpc>
+                <a:spcPct val="150000"/>
+              </a:lnSpc>
               <a:spcAft>
                 <a:spcPts val="300"/>
               </a:spcAft>
@@ -3466,12 +3519,23 @@
               <a:buChar char="•"/>
             </a:pPr>
             <a:r>
+              <a:rPr lang="en-US" b="1" dirty="0" err="1"/>
+              <a:t>Ncol</a:t>
+            </a:r>
+            <a:r>
+              <a:rPr lang="en-US" b="1" dirty="0"/>
+              <a:t>:</a:t>
+            </a:r>
+            <a:r>
               <a:rPr lang="en-US" dirty="0"/>
-              <a:t>Fixed length data</a:t>
+              <a:t> Number of columns total</a:t>
             </a:r>
           </a:p>
           <a:p>
             <a:pPr marL="742950" lvl="1" indent="-285750">
+              <a:lnSpc>
+                <a:spcPct val="150000"/>
+              </a:lnSpc>
               <a:spcAft>
                 <a:spcPts val="300"/>
               </a:spcAft>
@@ -3479,12 +3543,23 @@
               <a:buChar char="•"/>
             </a:pPr>
             <a:r>
+              <a:rPr lang="en-US" b="1" dirty="0" err="1"/>
+              <a:t>Nullbits</a:t>
+            </a:r>
+            <a:r>
+              <a:rPr lang="en-US" b="1" dirty="0"/>
+              <a:t>: </a:t>
+            </a:r>
+            <a:r>
               <a:rPr lang="en-US" dirty="0"/>
-              <a:t>Number of columns total</a:t>
-            </a:r>
-          </a:p>
-          <a:p>
-            <a:pPr marL="742950" lvl="1" indent="-285750">
+              <a:t>Null bitmap array (for all columns)</a:t>
+            </a:r>
+          </a:p>
+          <a:p>
+            <a:pPr marL="285750" indent="-285750">
+              <a:lnSpc>
+                <a:spcPct val="150000"/>
+              </a:lnSpc>
               <a:spcAft>
                 <a:spcPts val="300"/>
               </a:spcAft>
@@ -3493,11 +3568,14 @@
             </a:pPr>
             <a:r>
               <a:rPr lang="en-US" dirty="0"/>
-              <a:t>Null bitmap array (for all columns)</a:t>
-            </a:r>
-          </a:p>
-          <a:p>
-            <a:pPr marL="285750" indent="-285750">
+              <a:t>Variable length:</a:t>
+            </a:r>
+          </a:p>
+          <a:p>
+            <a:pPr marL="742950" lvl="1" indent="-285750">
+              <a:lnSpc>
+                <a:spcPct val="150000"/>
+              </a:lnSpc>
               <a:spcAft>
                 <a:spcPts val="300"/>
               </a:spcAft>
@@ -3505,12 +3583,23 @@
               <a:buChar char="•"/>
             </a:pPr>
             <a:r>
+              <a:rPr lang="en-US" b="1" dirty="0" err="1"/>
+              <a:t>VarCount</a:t>
+            </a:r>
+            <a:r>
+              <a:rPr lang="en-US" b="1" dirty="0"/>
+              <a:t>:</a:t>
+            </a:r>
+            <a:r>
               <a:rPr lang="en-US" dirty="0"/>
-              <a:t>Variable length:</a:t>
+              <a:t> Number of columns n</a:t>
             </a:r>
           </a:p>
           <a:p>
             <a:pPr marL="742950" lvl="1" indent="-285750">
+              <a:lnSpc>
+                <a:spcPct val="150000"/>
+              </a:lnSpc>
               <a:spcAft>
                 <a:spcPts val="300"/>
               </a:spcAft>
@@ -3518,42 +3607,70 @@
               <a:buChar char="•"/>
             </a:pPr>
             <a:r>
+              <a:rPr lang="en-US" b="1" dirty="0" err="1"/>
+              <a:t>VarOffset</a:t>
+            </a:r>
+            <a:r>
+              <a:rPr lang="en-US" b="1" dirty="0"/>
+              <a:t>:</a:t>
+            </a:r>
+            <a:r>
               <a:rPr lang="en-US" dirty="0"/>
-              <a:t>Number of columns n</a:t>
-            </a:r>
-          </a:p>
-          <a:p>
-            <a:pPr marL="742950" lvl="1" indent="-285750">
-              <a:spcAft>
-                <a:spcPts val="300"/>
-              </a:spcAft>
-              <a:buFont typeface="Arial" panose="020B0604020202020204" pitchFamily="34" charset="0"/>
-              <a:buChar char="•"/>
-            </a:pPr>
-            <a:r>
-              <a:rPr lang="en-US" dirty="0"/>
-              <a:t>Offset array with n offset values</a:t>
-            </a:r>
-          </a:p>
-          <a:p>
-            <a:pPr marL="742950" lvl="1" indent="-285750">
-              <a:spcAft>
-                <a:spcPts val="300"/>
-              </a:spcAft>
-              <a:buFont typeface="Arial" panose="020B0604020202020204" pitchFamily="34" charset="0"/>
-              <a:buChar char="•"/>
-            </a:pPr>
-            <a:r>
-              <a:rPr lang="en-US" dirty="0"/>
-              <a:t>Variable data at the end</a:t>
-            </a:r>
-          </a:p>
-          <a:p>
-            <a:pPr marL="742950" lvl="1" indent="-285750">
-              <a:buFont typeface="Arial" panose="020B0604020202020204" pitchFamily="34" charset="0"/>
-              <a:buChar char="•"/>
-            </a:pPr>
-            <a:endParaRPr lang="en-US" dirty="0"/>
+              <a:t> Offset array with n offset values</a:t>
+            </a:r>
+          </a:p>
+        </p:txBody>
+      </p:sp>
+      <p:sp>
+        <p:nvSpPr>
+          <p:cNvPr id="10" name="Titel 1">
+            <a:extLst>
+              <a:ext uri="{FF2B5EF4-FFF2-40B4-BE49-F238E27FC236}">
+                <a16:creationId xmlns:a16="http://schemas.microsoft.com/office/drawing/2014/main" id="{C902D909-FFD7-4C4E-BEC2-E1D843BF99DB}"/>
+              </a:ext>
+            </a:extLst>
+          </p:cNvPr>
+          <p:cNvSpPr txBox="1">
+            <a:spLocks/>
+          </p:cNvSpPr>
+          <p:nvPr/>
+        </p:nvSpPr>
+        <p:spPr>
+          <a:xfrm>
+            <a:off x="850665" y="671518"/>
+            <a:ext cx="10515600" cy="471587"/>
+          </a:xfrm>
+          <a:prstGeom prst="rect">
+            <a:avLst/>
+          </a:prstGeom>
+        </p:spPr>
+        <p:txBody>
+          <a:bodyPr/>
+          <a:lstStyle>
+            <a:lvl1pPr algn="l" defTabSz="914400" rtl="0" eaLnBrk="1" latinLnBrk="0" hangingPunct="1">
+              <a:lnSpc>
+                <a:spcPct val="90000"/>
+              </a:lnSpc>
+              <a:spcBef>
+                <a:spcPct val="0"/>
+              </a:spcBef>
+              <a:buNone/>
+              <a:defRPr sz="3000" kern="1200">
+                <a:solidFill>
+                  <a:schemeClr val="tx1"/>
+                </a:solidFill>
+                <a:latin typeface="+mj-lt"/>
+                <a:ea typeface="+mj-ea"/>
+                <a:cs typeface="+mj-cs"/>
+              </a:defRPr>
+            </a:lvl1pPr>
+          </a:lstStyle>
+          <a:p>
+            <a:r>
+              <a:rPr lang="en-GB" dirty="0"/>
+              <a:t>Record Format SQL Server</a:t>
+            </a:r>
+            <a:endParaRPr lang="de-DE" dirty="0"/>
           </a:p>
         </p:txBody>
       </p:sp>
@@ -3589,48 +3706,6 @@
       </p:grpSpPr>
       <p:sp>
         <p:nvSpPr>
-          <p:cNvPr id="2" name="Titel 1">
-            <a:extLst>
-              <a:ext uri="{FF2B5EF4-FFF2-40B4-BE49-F238E27FC236}">
-                <a16:creationId xmlns:a16="http://schemas.microsoft.com/office/drawing/2014/main" id="{156F9A4B-14F9-4005-9997-60611524F633}"/>
-              </a:ext>
-            </a:extLst>
-          </p:cNvPr>
-          <p:cNvSpPr>
-            <a:spLocks noGrp="1"/>
-          </p:cNvSpPr>
-          <p:nvPr>
-            <p:ph type="title"/>
-          </p:nvPr>
-        </p:nvSpPr>
-        <p:spPr>
-          <a:xfrm>
-            <a:off x="750776" y="476672"/>
-            <a:ext cx="10515600" cy="471587"/>
-          </a:xfrm>
-        </p:spPr>
-        <p:txBody>
-          <a:bodyPr/>
-          <a:lstStyle/>
-          <a:p>
-            <a:r>
-              <a:rPr lang="de-DE" dirty="0" err="1"/>
-              <a:t>Record</a:t>
-            </a:r>
-            <a:r>
-              <a:rPr lang="de-DE" dirty="0"/>
-              <a:t> </a:t>
-            </a:r>
-            <a:r>
-              <a:rPr lang="de-DE" dirty="0" err="1"/>
-              <a:t>Example</a:t>
-            </a:r>
-            <a:endParaRPr lang="de-DE" dirty="0"/>
-          </a:p>
-        </p:txBody>
-      </p:sp>
-      <p:sp>
-        <p:nvSpPr>
           <p:cNvPr id="4" name="Foliennummernplatzhalter 3">
             <a:extLst>
               <a:ext uri="{FF2B5EF4-FFF2-40B4-BE49-F238E27FC236}">
@@ -3723,11 +3798,72 @@
         </p:blipFill>
         <p:spPr>
           <a:xfrm>
-            <a:off x="1055440" y="1844824"/>
-            <a:ext cx="8182981" cy="2676805"/>
+            <a:off x="983432" y="1844824"/>
+            <a:ext cx="9063493" cy="2964837"/>
           </a:xfrm>
         </p:spPr>
       </p:pic>
+      <p:sp>
+        <p:nvSpPr>
+          <p:cNvPr id="6" name="Titel 1">
+            <a:extLst>
+              <a:ext uri="{FF2B5EF4-FFF2-40B4-BE49-F238E27FC236}">
+                <a16:creationId xmlns:a16="http://schemas.microsoft.com/office/drawing/2014/main" id="{FC5E80F3-28A2-4DEA-9958-C6C2ACEDA83B}"/>
+              </a:ext>
+            </a:extLst>
+          </p:cNvPr>
+          <p:cNvSpPr txBox="1">
+            <a:spLocks/>
+          </p:cNvSpPr>
+          <p:nvPr/>
+        </p:nvSpPr>
+        <p:spPr>
+          <a:xfrm>
+            <a:off x="850665" y="671518"/>
+            <a:ext cx="10515600" cy="471587"/>
+          </a:xfrm>
+          <a:prstGeom prst="rect">
+            <a:avLst/>
+          </a:prstGeom>
+        </p:spPr>
+        <p:txBody>
+          <a:bodyPr/>
+          <a:lstStyle>
+            <a:lvl1pPr algn="l" defTabSz="914400" rtl="0" eaLnBrk="1" latinLnBrk="0" hangingPunct="1">
+              <a:lnSpc>
+                <a:spcPct val="90000"/>
+              </a:lnSpc>
+              <a:spcBef>
+                <a:spcPct val="0"/>
+              </a:spcBef>
+              <a:buNone/>
+              <a:defRPr sz="3000" kern="1200">
+                <a:solidFill>
+                  <a:schemeClr val="tx1"/>
+                </a:solidFill>
+                <a:latin typeface="+mj-lt"/>
+                <a:ea typeface="+mj-ea"/>
+                <a:cs typeface="+mj-cs"/>
+              </a:defRPr>
+            </a:lvl1pPr>
+          </a:lstStyle>
+          <a:p>
+            <a:r>
+              <a:rPr lang="de-DE" dirty="0" err="1"/>
+              <a:t>Record</a:t>
+            </a:r>
+            <a:r>
+              <a:rPr lang="de-DE" dirty="0"/>
+              <a:t> </a:t>
+            </a:r>
+            <a:r>
+              <a:rPr lang="de-DE" dirty="0" err="1"/>
+              <a:t>Example</a:t>
+            </a:r>
+            <a:endParaRPr lang="de-DE" dirty="0"/>
+          </a:p>
+        </p:txBody>
+      </p:sp>
     </p:spTree>
     <p:extLst>
       <p:ext uri="{BB962C8B-B14F-4D97-AF65-F5344CB8AC3E}">
@@ -3760,39 +3896,6 @@
       </p:grpSpPr>
       <p:sp>
         <p:nvSpPr>
-          <p:cNvPr id="2" name="Titel 1">
-            <a:extLst>
-              <a:ext uri="{FF2B5EF4-FFF2-40B4-BE49-F238E27FC236}">
-                <a16:creationId xmlns:a16="http://schemas.microsoft.com/office/drawing/2014/main" id="{DE6F0AA5-7D49-4E98-9B98-AB73E2F052B6}"/>
-              </a:ext>
-            </a:extLst>
-          </p:cNvPr>
-          <p:cNvSpPr>
-            <a:spLocks noGrp="1"/>
-          </p:cNvSpPr>
-          <p:nvPr>
-            <p:ph type="title"/>
-          </p:nvPr>
-        </p:nvSpPr>
-        <p:spPr>
-          <a:xfrm>
-            <a:off x="816317" y="588287"/>
-            <a:ext cx="10515600" cy="471587"/>
-          </a:xfrm>
-        </p:spPr>
-        <p:txBody>
-          <a:bodyPr/>
-          <a:lstStyle/>
-          <a:p>
-            <a:r>
-              <a:rPr lang="en-US" dirty="0"/>
-              <a:t>Row overflow</a:t>
-            </a:r>
-          </a:p>
-        </p:txBody>
-      </p:sp>
-      <p:sp>
-        <p:nvSpPr>
           <p:cNvPr id="3" name="Inhaltsplatzhalter 2">
             <a:extLst>
               <a:ext uri="{FF2B5EF4-FFF2-40B4-BE49-F238E27FC236}">
@@ -3809,7 +3912,7 @@
         </p:nvSpPr>
         <p:spPr>
           <a:xfrm>
-            <a:off x="816317" y="1412776"/>
+            <a:off x="750776" y="1330588"/>
             <a:ext cx="10515600" cy="3355523"/>
           </a:xfrm>
         </p:spPr>
@@ -3821,10 +3924,13 @@
               <a:lnSpc>
                 <a:spcPct val="150000"/>
               </a:lnSpc>
+              <a:spcBef>
+                <a:spcPts val="800"/>
+              </a:spcBef>
             </a:pPr>
             <a:r>
               <a:rPr lang="en-US" dirty="0"/>
-              <a:t>Maximum size of row is 8060 Bytes (except text/image pages)</a:t>
+              <a:t>Maximum row size: 8060 Bytes (except text/image pages)</a:t>
             </a:r>
           </a:p>
           <a:p>
@@ -3832,6 +3938,9 @@
               <a:lnSpc>
                 <a:spcPct val="150000"/>
               </a:lnSpc>
+              <a:spcBef>
+                <a:spcPts val="800"/>
+              </a:spcBef>
             </a:pPr>
             <a:r>
               <a:rPr lang="en-US" dirty="0"/>
@@ -3843,6 +3952,9 @@
               <a:lnSpc>
                 <a:spcPct val="150000"/>
               </a:lnSpc>
+              <a:spcBef>
+                <a:spcPts val="800"/>
+              </a:spcBef>
             </a:pPr>
             <a:r>
               <a:rPr lang="en-US" dirty="0"/>
@@ -3854,7 +3966,7 @@
             </a:r>
             <a:r>
               <a:rPr lang="en-US" dirty="0"/>
-              <a:t> page</a:t>
+              <a:t> page </a:t>
             </a:r>
           </a:p>
           <a:p>
@@ -3862,6 +3974,9 @@
               <a:lnSpc>
                 <a:spcPct val="150000"/>
               </a:lnSpc>
+              <a:spcBef>
+                <a:spcPts val="800"/>
+              </a:spcBef>
             </a:pPr>
             <a:r>
               <a:rPr lang="en-US" dirty="0"/>
@@ -3873,18 +3988,21 @@
               <a:lnSpc>
                 <a:spcPct val="150000"/>
               </a:lnSpc>
+              <a:spcBef>
+                <a:spcPts val="800"/>
+              </a:spcBef>
             </a:pPr>
             <a:r>
               <a:rPr lang="en-US" dirty="0"/>
-              <a:t>Upon reduction of row size under 8060 Bytes moved columns get moved back from </a:t>
-            </a:r>
-            <a:r>
-              <a:rPr lang="en-US" dirty="0" err="1"/>
-              <a:t>ROW_OVERFLOW_Data</a:t>
-            </a:r>
-            <a:endParaRPr lang="en-US" dirty="0"/>
-          </a:p>
-          <a:p>
+              <a:t>Upon reduction of row size under 8060 Bytes moved columns get moved back from ROW_OVERFLOW_DATA</a:t>
+            </a:r>
+          </a:p>
+          <a:p>
+            <a:pPr>
+              <a:spcBef>
+                <a:spcPts val="800"/>
+              </a:spcBef>
+            </a:pPr>
             <a:endParaRPr lang="en-US" dirty="0"/>
           </a:p>
         </p:txBody>
@@ -3959,6 +4077,89 @@
           </a:p>
         </p:txBody>
       </p:sp>
+      <p:sp>
+        <p:nvSpPr>
+          <p:cNvPr id="7" name="Titel 1">
+            <a:extLst>
+              <a:ext uri="{FF2B5EF4-FFF2-40B4-BE49-F238E27FC236}">
+                <a16:creationId xmlns:a16="http://schemas.microsoft.com/office/drawing/2014/main" id="{F430F29E-7090-4404-B811-8E3FA886C688}"/>
+              </a:ext>
+            </a:extLst>
+          </p:cNvPr>
+          <p:cNvSpPr txBox="1">
+            <a:spLocks/>
+          </p:cNvSpPr>
+          <p:nvPr/>
+        </p:nvSpPr>
+        <p:spPr>
+          <a:xfrm>
+            <a:off x="850665" y="671518"/>
+            <a:ext cx="10515600" cy="471587"/>
+          </a:xfrm>
+          <a:prstGeom prst="rect">
+            <a:avLst/>
+          </a:prstGeom>
+        </p:spPr>
+        <p:txBody>
+          <a:bodyPr/>
+          <a:lstStyle>
+            <a:lvl1pPr algn="l" defTabSz="914400" rtl="0" eaLnBrk="1" latinLnBrk="0" hangingPunct="1">
+              <a:lnSpc>
+                <a:spcPct val="90000"/>
+              </a:lnSpc>
+              <a:spcBef>
+                <a:spcPct val="0"/>
+              </a:spcBef>
+              <a:buNone/>
+              <a:defRPr sz="3000" kern="1200">
+                <a:solidFill>
+                  <a:schemeClr val="tx1"/>
+                </a:solidFill>
+                <a:latin typeface="+mj-lt"/>
+                <a:ea typeface="+mj-ea"/>
+                <a:cs typeface="+mj-cs"/>
+              </a:defRPr>
+            </a:lvl1pPr>
+          </a:lstStyle>
+          <a:p>
+            <a:r>
+              <a:rPr lang="en-US" dirty="0"/>
+              <a:t>Row overflow</a:t>
+            </a:r>
+            <a:endParaRPr lang="de-DE" dirty="0"/>
+          </a:p>
+        </p:txBody>
+      </p:sp>
+      <p:pic>
+        <p:nvPicPr>
+          <p:cNvPr id="18" name="Grafik 17">
+            <a:extLst>
+              <a:ext uri="{FF2B5EF4-FFF2-40B4-BE49-F238E27FC236}">
+                <a16:creationId xmlns:a16="http://schemas.microsoft.com/office/drawing/2014/main" id="{980FF046-08AF-4357-936F-C9F4379FCFBF}"/>
+              </a:ext>
+            </a:extLst>
+          </p:cNvPr>
+          <p:cNvPicPr>
+            <a:picLocks noChangeAspect="1"/>
+          </p:cNvPicPr>
+          <p:nvPr/>
+        </p:nvPicPr>
+        <p:blipFill>
+          <a:blip r:embed="rId2"/>
+          <a:stretch>
+            <a:fillRect/>
+          </a:stretch>
+        </p:blipFill>
+        <p:spPr>
+          <a:xfrm>
+            <a:off x="1127448" y="3722379"/>
+            <a:ext cx="8266720" cy="2184332"/>
+          </a:xfrm>
+          <a:prstGeom prst="rect">
+            <a:avLst/>
+          </a:prstGeom>
+        </p:spPr>
+      </p:pic>
     </p:spTree>
     <p:extLst>
       <p:ext uri="{BB962C8B-B14F-4D97-AF65-F5344CB8AC3E}">
@@ -3991,39 +4192,6 @@
       </p:grpSpPr>
       <p:sp>
         <p:nvSpPr>
-          <p:cNvPr id="2" name="Titel 1">
-            <a:extLst>
-              <a:ext uri="{FF2B5EF4-FFF2-40B4-BE49-F238E27FC236}">
-                <a16:creationId xmlns:a16="http://schemas.microsoft.com/office/drawing/2014/main" id="{947418B5-90C6-4D27-9F1C-A2F0B6407DE6}"/>
-              </a:ext>
-            </a:extLst>
-          </p:cNvPr>
-          <p:cNvSpPr>
-            <a:spLocks noGrp="1"/>
-          </p:cNvSpPr>
-          <p:nvPr>
-            <p:ph type="title"/>
-          </p:nvPr>
-        </p:nvSpPr>
-        <p:spPr>
-          <a:xfrm>
-            <a:off x="816317" y="620688"/>
-            <a:ext cx="10515600" cy="471587"/>
-          </a:xfrm>
-        </p:spPr>
-        <p:txBody>
-          <a:bodyPr/>
-          <a:lstStyle/>
-          <a:p>
-            <a:r>
-              <a:rPr lang="de-DE" dirty="0"/>
-              <a:t>Sources</a:t>
-            </a:r>
-          </a:p>
-        </p:txBody>
-      </p:sp>
-      <p:sp>
-        <p:nvSpPr>
           <p:cNvPr id="3" name="Inhaltsplatzhalter 2">
             <a:extLst>
               <a:ext uri="{FF2B5EF4-FFF2-40B4-BE49-F238E27FC236}">
@@ -4087,6 +4255,18 @@
             <a:endParaRPr lang="de-DE" dirty="0"/>
           </a:p>
           <a:p>
+            <a:r>
+              <a:rPr lang="de-DE" dirty="0">
+                <a:hlinkClick r:id="rId6"/>
+              </a:rPr>
+              <a:t>https://git.uibk.ac.at/informatik/dbis/dbis-teaching/archimpl-course-material-2022/-/blob/main/slides/02_records.pdf</a:t>
+            </a:r>
+            <a:endParaRPr lang="de-DE" dirty="0"/>
+          </a:p>
+          <a:p>
+            <a:endParaRPr lang="de-DE" dirty="0"/>
+          </a:p>
+          <a:p>
             <a:endParaRPr lang="de-DE" dirty="0"/>
           </a:p>
         </p:txBody>
@@ -4158,6 +4338,59 @@
               <a:t>Gründlinger Diana, Huber Marcel, Klotz Thomas, Targa Aaron, Thalmann Matthias</a:t>
             </a:r>
             <a:endParaRPr lang="en-US" dirty="0"/>
+          </a:p>
+        </p:txBody>
+      </p:sp>
+      <p:sp>
+        <p:nvSpPr>
+          <p:cNvPr id="8" name="Titel 1">
+            <a:extLst>
+              <a:ext uri="{FF2B5EF4-FFF2-40B4-BE49-F238E27FC236}">
+                <a16:creationId xmlns:a16="http://schemas.microsoft.com/office/drawing/2014/main" id="{51C71758-A57A-49EF-A215-C6239CA76050}"/>
+              </a:ext>
+            </a:extLst>
+          </p:cNvPr>
+          <p:cNvSpPr txBox="1">
+            <a:spLocks/>
+          </p:cNvSpPr>
+          <p:nvPr/>
+        </p:nvSpPr>
+        <p:spPr>
+          <a:xfrm>
+            <a:off x="850665" y="671518"/>
+            <a:ext cx="10515600" cy="471587"/>
+          </a:xfrm>
+          <a:prstGeom prst="rect">
+            <a:avLst/>
+          </a:prstGeom>
+        </p:spPr>
+        <p:txBody>
+          <a:bodyPr/>
+          <a:lstStyle>
+            <a:lvl1pPr algn="l" defTabSz="914400" rtl="0" eaLnBrk="1" latinLnBrk="0" hangingPunct="1">
+              <a:lnSpc>
+                <a:spcPct val="90000"/>
+              </a:lnSpc>
+              <a:spcBef>
+                <a:spcPct val="0"/>
+              </a:spcBef>
+              <a:buNone/>
+              <a:defRPr sz="3000" kern="1200">
+                <a:solidFill>
+                  <a:schemeClr val="tx1"/>
+                </a:solidFill>
+                <a:latin typeface="+mj-lt"/>
+                <a:ea typeface="+mj-ea"/>
+                <a:cs typeface="+mj-cs"/>
+              </a:defRPr>
+            </a:lvl1pPr>
+          </a:lstStyle>
+          <a:p>
+            <a:r>
+              <a:rPr lang="en-US" dirty="0"/>
+              <a:t>Sources</a:t>
+            </a:r>
+            <a:endParaRPr lang="de-DE" dirty="0"/>
           </a:p>
         </p:txBody>
       </p:sp>

</xml_diff>